<commit_message>
presentation files changed screenshots added
</commit_message>
<xml_diff>
--- a/R Project.pptx
+++ b/R Project.pptx
@@ -13,7 +13,13 @@
     <p:sldId id="261" r:id="rId7"/>
     <p:sldId id="262" r:id="rId8"/>
     <p:sldId id="263" r:id="rId9"/>
-    <p:sldId id="264" r:id="rId10"/>
+    <p:sldId id="265" r:id="rId10"/>
+    <p:sldId id="266" r:id="rId11"/>
+    <p:sldId id="267" r:id="rId12"/>
+    <p:sldId id="268" r:id="rId13"/>
+    <p:sldId id="269" r:id="rId14"/>
+    <p:sldId id="270" r:id="rId15"/>
+    <p:sldId id="271" r:id="rId16"/>
   </p:sldIdLst>
   <p:sldSz cx="12192000" cy="6858000"/>
   <p:notesSz cx="6858000" cy="9144000"/>
@@ -112,6 +118,11 @@
       </a:defRPr>
     </a:lvl9pPr>
   </p:defaultTextStyle>
+  <p:extLst>
+    <p:ext uri="{EFAFB233-063F-42B5-8137-9DF3F51BA10A}">
+      <p15:sldGuideLst xmlns:p15="http://schemas.microsoft.com/office/powerpoint/2012/main"/>
+    </p:ext>
+  </p:extLst>
 </p:presentation>
 </file>
 
@@ -262,7 +273,7 @@
           <a:p>
             <a:fld id="{94292811-B672-4414-92C7-9E96F7F6D984}" type="datetimeFigureOut">
               <a:rPr lang="en-US" smtClean="0"/>
-              <a:t>4/15/2024</a:t>
+              <a:t>5/9/2024</a:t>
             </a:fld>
             <a:endParaRPr lang="en-US"/>
           </a:p>
@@ -460,7 +471,7 @@
           <a:p>
             <a:fld id="{94292811-B672-4414-92C7-9E96F7F6D984}" type="datetimeFigureOut">
               <a:rPr lang="en-US" smtClean="0"/>
-              <a:t>4/15/2024</a:t>
+              <a:t>5/9/2024</a:t>
             </a:fld>
             <a:endParaRPr lang="en-US"/>
           </a:p>
@@ -668,7 +679,7 @@
           <a:p>
             <a:fld id="{94292811-B672-4414-92C7-9E96F7F6D984}" type="datetimeFigureOut">
               <a:rPr lang="en-US" smtClean="0"/>
-              <a:t>4/15/2024</a:t>
+              <a:t>5/9/2024</a:t>
             </a:fld>
             <a:endParaRPr lang="en-US"/>
           </a:p>
@@ -866,7 +877,7 @@
           <a:p>
             <a:fld id="{94292811-B672-4414-92C7-9E96F7F6D984}" type="datetimeFigureOut">
               <a:rPr lang="en-US" smtClean="0"/>
-              <a:t>4/15/2024</a:t>
+              <a:t>5/9/2024</a:t>
             </a:fld>
             <a:endParaRPr lang="en-US"/>
           </a:p>
@@ -1141,7 +1152,7 @@
           <a:p>
             <a:fld id="{94292811-B672-4414-92C7-9E96F7F6D984}" type="datetimeFigureOut">
               <a:rPr lang="en-US" smtClean="0"/>
-              <a:t>4/15/2024</a:t>
+              <a:t>5/9/2024</a:t>
             </a:fld>
             <a:endParaRPr lang="en-US"/>
           </a:p>
@@ -1406,7 +1417,7 @@
           <a:p>
             <a:fld id="{94292811-B672-4414-92C7-9E96F7F6D984}" type="datetimeFigureOut">
               <a:rPr lang="en-US" smtClean="0"/>
-              <a:t>4/15/2024</a:t>
+              <a:t>5/9/2024</a:t>
             </a:fld>
             <a:endParaRPr lang="en-US"/>
           </a:p>
@@ -1818,7 +1829,7 @@
           <a:p>
             <a:fld id="{94292811-B672-4414-92C7-9E96F7F6D984}" type="datetimeFigureOut">
               <a:rPr lang="en-US" smtClean="0"/>
-              <a:t>4/15/2024</a:t>
+              <a:t>5/9/2024</a:t>
             </a:fld>
             <a:endParaRPr lang="en-US"/>
           </a:p>
@@ -1959,7 +1970,7 @@
           <a:p>
             <a:fld id="{94292811-B672-4414-92C7-9E96F7F6D984}" type="datetimeFigureOut">
               <a:rPr lang="en-US" smtClean="0"/>
-              <a:t>4/15/2024</a:t>
+              <a:t>5/9/2024</a:t>
             </a:fld>
             <a:endParaRPr lang="en-US"/>
           </a:p>
@@ -2072,7 +2083,7 @@
           <a:p>
             <a:fld id="{94292811-B672-4414-92C7-9E96F7F6D984}" type="datetimeFigureOut">
               <a:rPr lang="en-US" smtClean="0"/>
-              <a:t>4/15/2024</a:t>
+              <a:t>5/9/2024</a:t>
             </a:fld>
             <a:endParaRPr lang="en-US"/>
           </a:p>
@@ -2383,7 +2394,7 @@
           <a:p>
             <a:fld id="{94292811-B672-4414-92C7-9E96F7F6D984}" type="datetimeFigureOut">
               <a:rPr lang="en-US" smtClean="0"/>
-              <a:t>4/15/2024</a:t>
+              <a:t>5/9/2024</a:t>
             </a:fld>
             <a:endParaRPr lang="en-US"/>
           </a:p>
@@ -2671,7 +2682,7 @@
           <a:p>
             <a:fld id="{94292811-B672-4414-92C7-9E96F7F6D984}" type="datetimeFigureOut">
               <a:rPr lang="en-US" smtClean="0"/>
-              <a:t>4/15/2024</a:t>
+              <a:t>5/9/2024</a:t>
             </a:fld>
             <a:endParaRPr lang="en-US"/>
           </a:p>
@@ -2912,7 +2923,7 @@
           <a:p>
             <a:fld id="{94292811-B672-4414-92C7-9E96F7F6D984}" type="datetimeFigureOut">
               <a:rPr lang="en-US" smtClean="0"/>
-              <a:t>4/15/2024</a:t>
+              <a:t>5/9/2024</a:t>
             </a:fld>
             <a:endParaRPr lang="en-US"/>
           </a:p>
@@ -3390,15 +3401,7 @@
           <a:p>
             <a:r>
               <a:rPr lang="en-US" dirty="0"/>
-              <a:t>Analysis of </a:t>
-            </a:r>
-            <a:r>
-              <a:rPr lang="en-US" dirty="0" err="1"/>
-              <a:t>Youtube</a:t>
-            </a:r>
-            <a:r>
-              <a:rPr lang="en-US" dirty="0"/>
-              <a:t> Video trends for efficient prediction of future markets.</a:t>
+              <a:t>Analyzing You Tube tags to see whether they make significant contribution in generating the view count for trending videos</a:t>
             </a:r>
           </a:p>
         </p:txBody>
@@ -3757,6 +3760,1892 @@
     <p:extLst>
       <p:ext uri="{BB962C8B-B14F-4D97-AF65-F5344CB8AC3E}">
         <p14:creationId xmlns:p14="http://schemas.microsoft.com/office/powerpoint/2010/main" val="281102712"/>
+      </p:ext>
+    </p:extLst>
+  </p:cSld>
+  <p:clrMapOvr>
+    <a:masterClrMapping/>
+  </p:clrMapOvr>
+</p:sld>
+</file>
+
+<file path=ppt/slides/slide10.xml><?xml version="1.0" encoding="utf-8"?>
+<p:sld xmlns:a="http://schemas.openxmlformats.org/drawingml/2006/main" xmlns:r="http://schemas.openxmlformats.org/officeDocument/2006/relationships" xmlns:p="http://schemas.openxmlformats.org/presentationml/2006/main">
+  <p:cSld>
+    <p:spTree>
+      <p:nvGrpSpPr>
+        <p:cNvPr id="1" name=""/>
+        <p:cNvGrpSpPr/>
+        <p:nvPr/>
+      </p:nvGrpSpPr>
+      <p:grpSpPr>
+        <a:xfrm>
+          <a:off x="0" y="0"/>
+          <a:ext cx="0" cy="0"/>
+          <a:chOff x="0" y="0"/>
+          <a:chExt cx="0" cy="0"/>
+        </a:xfrm>
+      </p:grpSpPr>
+      <p:sp>
+        <p:nvSpPr>
+          <p:cNvPr id="2" name="Title 1">
+            <a:extLst>
+              <a:ext uri="{FF2B5EF4-FFF2-40B4-BE49-F238E27FC236}">
+                <a16:creationId xmlns:a16="http://schemas.microsoft.com/office/drawing/2014/main" id="{A9EBAA1E-6AF3-1949-E8B2-FBB8A66B59CA}"/>
+              </a:ext>
+            </a:extLst>
+          </p:cNvPr>
+          <p:cNvSpPr>
+            <a:spLocks noGrp="1"/>
+          </p:cNvSpPr>
+          <p:nvPr>
+            <p:ph type="title"/>
+          </p:nvPr>
+        </p:nvSpPr>
+        <p:spPr/>
+        <p:txBody>
+          <a:bodyPr/>
+          <a:lstStyle/>
+          <a:p>
+            <a:r>
+              <a:rPr lang="en-US" dirty="0"/>
+              <a:t>Preparing data for regression </a:t>
+            </a:r>
+          </a:p>
+        </p:txBody>
+      </p:sp>
+      <p:sp>
+        <p:nvSpPr>
+          <p:cNvPr id="4" name="Rectangle 1">
+            <a:extLst>
+              <a:ext uri="{FF2B5EF4-FFF2-40B4-BE49-F238E27FC236}">
+                <a16:creationId xmlns:a16="http://schemas.microsoft.com/office/drawing/2014/main" id="{E114A577-8A8D-88DB-B065-BE5A10F6297D}"/>
+              </a:ext>
+            </a:extLst>
+          </p:cNvPr>
+          <p:cNvSpPr>
+            <a:spLocks noGrp="1" noChangeArrowheads="1"/>
+          </p:cNvSpPr>
+          <p:nvPr>
+            <p:ph idx="1"/>
+          </p:nvPr>
+        </p:nvSpPr>
+        <p:spPr bwMode="auto">
+          <a:xfrm>
+            <a:off x="838199" y="2032536"/>
+            <a:ext cx="7521290" cy="276999"/>
+          </a:xfrm>
+          <a:prstGeom prst="rect">
+            <a:avLst/>
+          </a:prstGeom>
+          <a:solidFill>
+            <a:srgbClr val="FFFFFF"/>
+          </a:solidFill>
+          <a:ln>
+            <a:noFill/>
+          </a:ln>
+          <a:effectLst/>
+          <a:extLst>
+            <a:ext uri="{91240B29-F687-4F45-9708-019B960494DF}">
+              <a14:hiddenLine xmlns:a14="http://schemas.microsoft.com/office/drawing/2010/main" w="9525">
+                <a:solidFill>
+                  <a:schemeClr val="tx1"/>
+                </a:solidFill>
+                <a:miter lim="800000"/>
+                <a:headEnd/>
+                <a:tailEnd/>
+              </a14:hiddenLine>
+            </a:ext>
+            <a:ext uri="{AF507438-7753-43E0-B8FC-AC1667EBCBE1}">
+              <a14:hiddenEffects xmlns:a14="http://schemas.microsoft.com/office/drawing/2010/main">
+                <a:effectLst>
+                  <a:outerShdw dist="35921" dir="2700000" algn="ctr" rotWithShape="0">
+                    <a:schemeClr val="bg2"/>
+                  </a:outerShdw>
+                </a:effectLst>
+              </a14:hiddenEffects>
+            </a:ext>
+          </a:extLst>
+        </p:spPr>
+        <p:txBody>
+          <a:bodyPr vert="horz" wrap="none" lIns="0" tIns="0" rIns="0" bIns="0" numCol="1" anchor="ctr" anchorCtr="0" compatLnSpc="1">
+            <a:prstTxWarp prst="textNoShape">
+              <a:avLst/>
+            </a:prstTxWarp>
+            <a:spAutoFit/>
+          </a:bodyPr>
+          <a:lstStyle/>
+          <a:p>
+            <a:pPr marL="0" marR="0" lvl="0" indent="0" algn="l" defTabSz="914400" rtl="0" eaLnBrk="0" fontAlgn="base" latinLnBrk="0" hangingPunct="0">
+              <a:lnSpc>
+                <a:spcPct val="100000"/>
+              </a:lnSpc>
+              <a:spcBef>
+                <a:spcPct val="0"/>
+              </a:spcBef>
+              <a:spcAft>
+                <a:spcPct val="0"/>
+              </a:spcAft>
+              <a:buClrTx/>
+              <a:buSzTx/>
+              <a:buFontTx/>
+              <a:buNone/>
+              <a:tabLst/>
+            </a:pPr>
+            <a:r>
+              <a:rPr lang="en-US" altLang="en-US" sz="1800" dirty="0">
+                <a:solidFill>
+                  <a:srgbClr val="000000"/>
+                </a:solidFill>
+                <a:latin typeface="Times New Roman" panose="02020603050405020304" pitchFamily="18" charset="0"/>
+                <a:cs typeface="Times New Roman" panose="02020603050405020304" pitchFamily="18" charset="0"/>
+              </a:rPr>
+              <a:t>Selecting only </a:t>
+            </a:r>
+            <a:r>
+              <a:rPr lang="en-US" altLang="en-US" sz="1800" dirty="0" err="1">
+                <a:solidFill>
+                  <a:srgbClr val="000000"/>
+                </a:solidFill>
+                <a:latin typeface="Times New Roman" panose="02020603050405020304" pitchFamily="18" charset="0"/>
+                <a:cs typeface="Times New Roman" panose="02020603050405020304" pitchFamily="18" charset="0"/>
+              </a:rPr>
+              <a:t>video_ID</a:t>
+            </a:r>
+            <a:r>
+              <a:rPr lang="en-US" altLang="en-US" sz="1800" dirty="0">
+                <a:solidFill>
+                  <a:srgbClr val="000000"/>
+                </a:solidFill>
+                <a:latin typeface="Times New Roman" panose="02020603050405020304" pitchFamily="18" charset="0"/>
+                <a:cs typeface="Times New Roman" panose="02020603050405020304" pitchFamily="18" charset="0"/>
+              </a:rPr>
+              <a:t>, title, </a:t>
+            </a:r>
+            <a:r>
+              <a:rPr lang="en-US" altLang="en-US" sz="1800" dirty="0" err="1">
+                <a:solidFill>
+                  <a:srgbClr val="000000"/>
+                </a:solidFill>
+                <a:latin typeface="Times New Roman" panose="02020603050405020304" pitchFamily="18" charset="0"/>
+                <a:cs typeface="Times New Roman" panose="02020603050405020304" pitchFamily="18" charset="0"/>
+              </a:rPr>
+              <a:t>category_id</a:t>
+            </a:r>
+            <a:r>
+              <a:rPr lang="en-US" altLang="en-US" sz="1800" dirty="0">
+                <a:solidFill>
+                  <a:srgbClr val="000000"/>
+                </a:solidFill>
+                <a:latin typeface="Times New Roman" panose="02020603050405020304" pitchFamily="18" charset="0"/>
+                <a:cs typeface="Times New Roman" panose="02020603050405020304" pitchFamily="18" charset="0"/>
+              </a:rPr>
+              <a:t>, </a:t>
+            </a:r>
+            <a:r>
+              <a:rPr lang="en-US" altLang="en-US" sz="1800" dirty="0" err="1">
+                <a:solidFill>
+                  <a:srgbClr val="000000"/>
+                </a:solidFill>
+                <a:latin typeface="Times New Roman" panose="02020603050405020304" pitchFamily="18" charset="0"/>
+                <a:cs typeface="Times New Roman" panose="02020603050405020304" pitchFamily="18" charset="0"/>
+              </a:rPr>
+              <a:t>view_count</a:t>
+            </a:r>
+            <a:r>
+              <a:rPr lang="en-US" altLang="en-US" sz="1800" dirty="0">
+                <a:solidFill>
+                  <a:srgbClr val="000000"/>
+                </a:solidFill>
+                <a:latin typeface="Times New Roman" panose="02020603050405020304" pitchFamily="18" charset="0"/>
+                <a:cs typeface="Times New Roman" panose="02020603050405020304" pitchFamily="18" charset="0"/>
+              </a:rPr>
+              <a:t>, tags for regression model</a:t>
+            </a:r>
+            <a:endParaRPr kumimoji="0" lang="en-US" altLang="en-US" sz="1800" b="0" i="0" u="none" strike="noStrike" cap="none" normalizeH="0" baseline="0" dirty="0">
+              <a:ln>
+                <a:noFill/>
+              </a:ln>
+              <a:solidFill>
+                <a:schemeClr val="tx1"/>
+              </a:solidFill>
+              <a:effectLst/>
+              <a:latin typeface="Times New Roman" panose="02020603050405020304" pitchFamily="18" charset="0"/>
+              <a:cs typeface="Times New Roman" panose="02020603050405020304" pitchFamily="18" charset="0"/>
+            </a:endParaRPr>
+          </a:p>
+        </p:txBody>
+      </p:sp>
+      <p:sp>
+        <p:nvSpPr>
+          <p:cNvPr id="5" name="Rectangle 1">
+            <a:extLst>
+              <a:ext uri="{FF2B5EF4-FFF2-40B4-BE49-F238E27FC236}">
+                <a16:creationId xmlns:a16="http://schemas.microsoft.com/office/drawing/2014/main" id="{88D37CC6-CFAC-525F-3D16-41DB81A26221}"/>
+              </a:ext>
+            </a:extLst>
+          </p:cNvPr>
+          <p:cNvSpPr txBox="1">
+            <a:spLocks noChangeArrowheads="1"/>
+          </p:cNvSpPr>
+          <p:nvPr/>
+        </p:nvSpPr>
+        <p:spPr bwMode="auto">
+          <a:xfrm>
+            <a:off x="838199" y="2789883"/>
+            <a:ext cx="9574162" cy="553998"/>
+          </a:xfrm>
+          <a:prstGeom prst="rect">
+            <a:avLst/>
+          </a:prstGeom>
+          <a:solidFill>
+            <a:srgbClr val="FFFFFF"/>
+          </a:solidFill>
+          <a:ln>
+            <a:noFill/>
+          </a:ln>
+          <a:effectLst/>
+          <a:extLst>
+            <a:ext uri="{91240B29-F687-4F45-9708-019B960494DF}">
+              <a14:hiddenLine xmlns:a14="http://schemas.microsoft.com/office/drawing/2010/main" w="9525">
+                <a:solidFill>
+                  <a:schemeClr val="tx1"/>
+                </a:solidFill>
+                <a:miter lim="800000"/>
+                <a:headEnd/>
+                <a:tailEnd/>
+              </a14:hiddenLine>
+            </a:ext>
+            <a:ext uri="{AF507438-7753-43E0-B8FC-AC1667EBCBE1}">
+              <a14:hiddenEffects xmlns:a14="http://schemas.microsoft.com/office/drawing/2010/main">
+                <a:effectLst>
+                  <a:outerShdw dist="35921" dir="2700000" algn="ctr" rotWithShape="0">
+                    <a:schemeClr val="bg2"/>
+                  </a:outerShdw>
+                </a:effectLst>
+              </a14:hiddenEffects>
+            </a:ext>
+          </a:extLst>
+        </p:spPr>
+        <p:txBody>
+          <a:bodyPr vert="horz" wrap="square" lIns="0" tIns="0" rIns="0" bIns="0" numCol="1" rtlCol="0" anchor="ctr" anchorCtr="0" compatLnSpc="1">
+            <a:prstTxWarp prst="textNoShape">
+              <a:avLst/>
+            </a:prstTxWarp>
+            <a:spAutoFit/>
+          </a:bodyPr>
+          <a:lstStyle>
+            <a:lvl1pPr marL="228600" indent="-228600" algn="l" defTabSz="914400" rtl="0" eaLnBrk="1" latinLnBrk="0" hangingPunct="1">
+              <a:lnSpc>
+                <a:spcPct val="90000"/>
+              </a:lnSpc>
+              <a:spcBef>
+                <a:spcPts val="1000"/>
+              </a:spcBef>
+              <a:buFont typeface="Arial" panose="020B0604020202020204" pitchFamily="34" charset="0"/>
+              <a:buChar char="•"/>
+              <a:defRPr sz="2800" kern="1200">
+                <a:solidFill>
+                  <a:schemeClr val="tx1"/>
+                </a:solidFill>
+                <a:latin typeface="+mn-lt"/>
+                <a:ea typeface="+mn-ea"/>
+                <a:cs typeface="+mn-cs"/>
+              </a:defRPr>
+            </a:lvl1pPr>
+            <a:lvl2pPr marL="685800" indent="-228600" algn="l" defTabSz="914400" rtl="0" eaLnBrk="1" latinLnBrk="0" hangingPunct="1">
+              <a:lnSpc>
+                <a:spcPct val="90000"/>
+              </a:lnSpc>
+              <a:spcBef>
+                <a:spcPts val="500"/>
+              </a:spcBef>
+              <a:buFont typeface="Arial" panose="020B0604020202020204" pitchFamily="34" charset="0"/>
+              <a:buChar char="•"/>
+              <a:defRPr sz="2400" kern="1200">
+                <a:solidFill>
+                  <a:schemeClr val="tx1"/>
+                </a:solidFill>
+                <a:latin typeface="+mn-lt"/>
+                <a:ea typeface="+mn-ea"/>
+                <a:cs typeface="+mn-cs"/>
+              </a:defRPr>
+            </a:lvl2pPr>
+            <a:lvl3pPr marL="1143000" indent="-228600" algn="l" defTabSz="914400" rtl="0" eaLnBrk="1" latinLnBrk="0" hangingPunct="1">
+              <a:lnSpc>
+                <a:spcPct val="90000"/>
+              </a:lnSpc>
+              <a:spcBef>
+                <a:spcPts val="500"/>
+              </a:spcBef>
+              <a:buFont typeface="Arial" panose="020B0604020202020204" pitchFamily="34" charset="0"/>
+              <a:buChar char="•"/>
+              <a:defRPr sz="2000" kern="1200">
+                <a:solidFill>
+                  <a:schemeClr val="tx1"/>
+                </a:solidFill>
+                <a:latin typeface="+mn-lt"/>
+                <a:ea typeface="+mn-ea"/>
+                <a:cs typeface="+mn-cs"/>
+              </a:defRPr>
+            </a:lvl3pPr>
+            <a:lvl4pPr marL="1600200" indent="-228600" algn="l" defTabSz="914400" rtl="0" eaLnBrk="1" latinLnBrk="0" hangingPunct="1">
+              <a:lnSpc>
+                <a:spcPct val="90000"/>
+              </a:lnSpc>
+              <a:spcBef>
+                <a:spcPts val="500"/>
+              </a:spcBef>
+              <a:buFont typeface="Arial" panose="020B0604020202020204" pitchFamily="34" charset="0"/>
+              <a:buChar char="•"/>
+              <a:defRPr sz="1800" kern="1200">
+                <a:solidFill>
+                  <a:schemeClr val="tx1"/>
+                </a:solidFill>
+                <a:latin typeface="+mn-lt"/>
+                <a:ea typeface="+mn-ea"/>
+                <a:cs typeface="+mn-cs"/>
+              </a:defRPr>
+            </a:lvl4pPr>
+            <a:lvl5pPr marL="2057400" indent="-228600" algn="l" defTabSz="914400" rtl="0" eaLnBrk="1" latinLnBrk="0" hangingPunct="1">
+              <a:lnSpc>
+                <a:spcPct val="90000"/>
+              </a:lnSpc>
+              <a:spcBef>
+                <a:spcPts val="500"/>
+              </a:spcBef>
+              <a:buFont typeface="Arial" panose="020B0604020202020204" pitchFamily="34" charset="0"/>
+              <a:buChar char="•"/>
+              <a:defRPr sz="1800" kern="1200">
+                <a:solidFill>
+                  <a:schemeClr val="tx1"/>
+                </a:solidFill>
+                <a:latin typeface="+mn-lt"/>
+                <a:ea typeface="+mn-ea"/>
+                <a:cs typeface="+mn-cs"/>
+              </a:defRPr>
+            </a:lvl5pPr>
+            <a:lvl6pPr marL="2514600" indent="-228600" algn="l" defTabSz="914400" rtl="0" eaLnBrk="1" latinLnBrk="0" hangingPunct="1">
+              <a:lnSpc>
+                <a:spcPct val="90000"/>
+              </a:lnSpc>
+              <a:spcBef>
+                <a:spcPts val="500"/>
+              </a:spcBef>
+              <a:buFont typeface="Arial" panose="020B0604020202020204" pitchFamily="34" charset="0"/>
+              <a:buChar char="•"/>
+              <a:defRPr sz="1800" kern="1200">
+                <a:solidFill>
+                  <a:schemeClr val="tx1"/>
+                </a:solidFill>
+                <a:latin typeface="+mn-lt"/>
+                <a:ea typeface="+mn-ea"/>
+                <a:cs typeface="+mn-cs"/>
+              </a:defRPr>
+            </a:lvl6pPr>
+            <a:lvl7pPr marL="2971800" indent="-228600" algn="l" defTabSz="914400" rtl="0" eaLnBrk="1" latinLnBrk="0" hangingPunct="1">
+              <a:lnSpc>
+                <a:spcPct val="90000"/>
+              </a:lnSpc>
+              <a:spcBef>
+                <a:spcPts val="500"/>
+              </a:spcBef>
+              <a:buFont typeface="Arial" panose="020B0604020202020204" pitchFamily="34" charset="0"/>
+              <a:buChar char="•"/>
+              <a:defRPr sz="1800" kern="1200">
+                <a:solidFill>
+                  <a:schemeClr val="tx1"/>
+                </a:solidFill>
+                <a:latin typeface="+mn-lt"/>
+                <a:ea typeface="+mn-ea"/>
+                <a:cs typeface="+mn-cs"/>
+              </a:defRPr>
+            </a:lvl7pPr>
+            <a:lvl8pPr marL="3429000" indent="-228600" algn="l" defTabSz="914400" rtl="0" eaLnBrk="1" latinLnBrk="0" hangingPunct="1">
+              <a:lnSpc>
+                <a:spcPct val="90000"/>
+              </a:lnSpc>
+              <a:spcBef>
+                <a:spcPts val="500"/>
+              </a:spcBef>
+              <a:buFont typeface="Arial" panose="020B0604020202020204" pitchFamily="34" charset="0"/>
+              <a:buChar char="•"/>
+              <a:defRPr sz="1800" kern="1200">
+                <a:solidFill>
+                  <a:schemeClr val="tx1"/>
+                </a:solidFill>
+                <a:latin typeface="+mn-lt"/>
+                <a:ea typeface="+mn-ea"/>
+                <a:cs typeface="+mn-cs"/>
+              </a:defRPr>
+            </a:lvl8pPr>
+            <a:lvl9pPr marL="3886200" indent="-228600" algn="l" defTabSz="914400" rtl="0" eaLnBrk="1" latinLnBrk="0" hangingPunct="1">
+              <a:lnSpc>
+                <a:spcPct val="90000"/>
+              </a:lnSpc>
+              <a:spcBef>
+                <a:spcPts val="500"/>
+              </a:spcBef>
+              <a:buFont typeface="Arial" panose="020B0604020202020204" pitchFamily="34" charset="0"/>
+              <a:buChar char="•"/>
+              <a:defRPr sz="1800" kern="1200">
+                <a:solidFill>
+                  <a:schemeClr val="tx1"/>
+                </a:solidFill>
+                <a:latin typeface="+mn-lt"/>
+                <a:ea typeface="+mn-ea"/>
+                <a:cs typeface="+mn-cs"/>
+              </a:defRPr>
+            </a:lvl9pPr>
+          </a:lstStyle>
+          <a:p>
+            <a:pPr marL="0" indent="0" eaLnBrk="0" fontAlgn="base" hangingPunct="0">
+              <a:lnSpc>
+                <a:spcPct val="100000"/>
+              </a:lnSpc>
+              <a:spcBef>
+                <a:spcPct val="0"/>
+              </a:spcBef>
+              <a:spcAft>
+                <a:spcPct val="0"/>
+              </a:spcAft>
+              <a:buFontTx/>
+              <a:buNone/>
+            </a:pPr>
+            <a:r>
+              <a:rPr lang="en-US" altLang="en-US" sz="1800" dirty="0">
+                <a:latin typeface="Times New Roman" panose="02020603050405020304" pitchFamily="18" charset="0"/>
+                <a:cs typeface="Times New Roman" panose="02020603050405020304" pitchFamily="18" charset="0"/>
+              </a:rPr>
+              <a:t>Generating weights for each tags based on their frequency.  Weight = frequency of a tag/sum(total frequency)</a:t>
+            </a:r>
+          </a:p>
+        </p:txBody>
+      </p:sp>
+      <p:sp>
+        <p:nvSpPr>
+          <p:cNvPr id="3" name="Rectangle 1">
+            <a:extLst>
+              <a:ext uri="{FF2B5EF4-FFF2-40B4-BE49-F238E27FC236}">
+                <a16:creationId xmlns:a16="http://schemas.microsoft.com/office/drawing/2014/main" id="{D53D7F5A-07D0-4123-A519-E60E3DDA9816}"/>
+              </a:ext>
+            </a:extLst>
+          </p:cNvPr>
+          <p:cNvSpPr txBox="1">
+            <a:spLocks noChangeArrowheads="1"/>
+          </p:cNvSpPr>
+          <p:nvPr/>
+        </p:nvSpPr>
+        <p:spPr bwMode="auto">
+          <a:xfrm>
+            <a:off x="838199" y="3685729"/>
+            <a:ext cx="9574162" cy="276999"/>
+          </a:xfrm>
+          <a:prstGeom prst="rect">
+            <a:avLst/>
+          </a:prstGeom>
+          <a:solidFill>
+            <a:srgbClr val="FFFFFF"/>
+          </a:solidFill>
+          <a:ln>
+            <a:noFill/>
+          </a:ln>
+          <a:effectLst/>
+          <a:extLst>
+            <a:ext uri="{91240B29-F687-4F45-9708-019B960494DF}">
+              <a14:hiddenLine xmlns:a14="http://schemas.microsoft.com/office/drawing/2010/main" w="9525">
+                <a:solidFill>
+                  <a:schemeClr val="tx1"/>
+                </a:solidFill>
+                <a:miter lim="800000"/>
+                <a:headEnd/>
+                <a:tailEnd/>
+              </a14:hiddenLine>
+            </a:ext>
+            <a:ext uri="{AF507438-7753-43E0-B8FC-AC1667EBCBE1}">
+              <a14:hiddenEffects xmlns:a14="http://schemas.microsoft.com/office/drawing/2010/main">
+                <a:effectLst>
+                  <a:outerShdw dist="35921" dir="2700000" algn="ctr" rotWithShape="0">
+                    <a:schemeClr val="bg2"/>
+                  </a:outerShdw>
+                </a:effectLst>
+              </a14:hiddenEffects>
+            </a:ext>
+          </a:extLst>
+        </p:spPr>
+        <p:txBody>
+          <a:bodyPr vert="horz" wrap="square" lIns="0" tIns="0" rIns="0" bIns="0" numCol="1" rtlCol="0" anchor="ctr" anchorCtr="0" compatLnSpc="1">
+            <a:prstTxWarp prst="textNoShape">
+              <a:avLst/>
+            </a:prstTxWarp>
+            <a:spAutoFit/>
+          </a:bodyPr>
+          <a:lstStyle>
+            <a:lvl1pPr marL="228600" indent="-228600" algn="l" defTabSz="914400" rtl="0" eaLnBrk="1" latinLnBrk="0" hangingPunct="1">
+              <a:lnSpc>
+                <a:spcPct val="90000"/>
+              </a:lnSpc>
+              <a:spcBef>
+                <a:spcPts val="1000"/>
+              </a:spcBef>
+              <a:buFont typeface="Arial" panose="020B0604020202020204" pitchFamily="34" charset="0"/>
+              <a:buChar char="•"/>
+              <a:defRPr sz="2800" kern="1200">
+                <a:solidFill>
+                  <a:schemeClr val="tx1"/>
+                </a:solidFill>
+                <a:latin typeface="+mn-lt"/>
+                <a:ea typeface="+mn-ea"/>
+                <a:cs typeface="+mn-cs"/>
+              </a:defRPr>
+            </a:lvl1pPr>
+            <a:lvl2pPr marL="685800" indent="-228600" algn="l" defTabSz="914400" rtl="0" eaLnBrk="1" latinLnBrk="0" hangingPunct="1">
+              <a:lnSpc>
+                <a:spcPct val="90000"/>
+              </a:lnSpc>
+              <a:spcBef>
+                <a:spcPts val="500"/>
+              </a:spcBef>
+              <a:buFont typeface="Arial" panose="020B0604020202020204" pitchFamily="34" charset="0"/>
+              <a:buChar char="•"/>
+              <a:defRPr sz="2400" kern="1200">
+                <a:solidFill>
+                  <a:schemeClr val="tx1"/>
+                </a:solidFill>
+                <a:latin typeface="+mn-lt"/>
+                <a:ea typeface="+mn-ea"/>
+                <a:cs typeface="+mn-cs"/>
+              </a:defRPr>
+            </a:lvl2pPr>
+            <a:lvl3pPr marL="1143000" indent="-228600" algn="l" defTabSz="914400" rtl="0" eaLnBrk="1" latinLnBrk="0" hangingPunct="1">
+              <a:lnSpc>
+                <a:spcPct val="90000"/>
+              </a:lnSpc>
+              <a:spcBef>
+                <a:spcPts val="500"/>
+              </a:spcBef>
+              <a:buFont typeface="Arial" panose="020B0604020202020204" pitchFamily="34" charset="0"/>
+              <a:buChar char="•"/>
+              <a:defRPr sz="2000" kern="1200">
+                <a:solidFill>
+                  <a:schemeClr val="tx1"/>
+                </a:solidFill>
+                <a:latin typeface="+mn-lt"/>
+                <a:ea typeface="+mn-ea"/>
+                <a:cs typeface="+mn-cs"/>
+              </a:defRPr>
+            </a:lvl3pPr>
+            <a:lvl4pPr marL="1600200" indent="-228600" algn="l" defTabSz="914400" rtl="0" eaLnBrk="1" latinLnBrk="0" hangingPunct="1">
+              <a:lnSpc>
+                <a:spcPct val="90000"/>
+              </a:lnSpc>
+              <a:spcBef>
+                <a:spcPts val="500"/>
+              </a:spcBef>
+              <a:buFont typeface="Arial" panose="020B0604020202020204" pitchFamily="34" charset="0"/>
+              <a:buChar char="•"/>
+              <a:defRPr sz="1800" kern="1200">
+                <a:solidFill>
+                  <a:schemeClr val="tx1"/>
+                </a:solidFill>
+                <a:latin typeface="+mn-lt"/>
+                <a:ea typeface="+mn-ea"/>
+                <a:cs typeface="+mn-cs"/>
+              </a:defRPr>
+            </a:lvl4pPr>
+            <a:lvl5pPr marL="2057400" indent="-228600" algn="l" defTabSz="914400" rtl="0" eaLnBrk="1" latinLnBrk="0" hangingPunct="1">
+              <a:lnSpc>
+                <a:spcPct val="90000"/>
+              </a:lnSpc>
+              <a:spcBef>
+                <a:spcPts val="500"/>
+              </a:spcBef>
+              <a:buFont typeface="Arial" panose="020B0604020202020204" pitchFamily="34" charset="0"/>
+              <a:buChar char="•"/>
+              <a:defRPr sz="1800" kern="1200">
+                <a:solidFill>
+                  <a:schemeClr val="tx1"/>
+                </a:solidFill>
+                <a:latin typeface="+mn-lt"/>
+                <a:ea typeface="+mn-ea"/>
+                <a:cs typeface="+mn-cs"/>
+              </a:defRPr>
+            </a:lvl5pPr>
+            <a:lvl6pPr marL="2514600" indent="-228600" algn="l" defTabSz="914400" rtl="0" eaLnBrk="1" latinLnBrk="0" hangingPunct="1">
+              <a:lnSpc>
+                <a:spcPct val="90000"/>
+              </a:lnSpc>
+              <a:spcBef>
+                <a:spcPts val="500"/>
+              </a:spcBef>
+              <a:buFont typeface="Arial" panose="020B0604020202020204" pitchFamily="34" charset="0"/>
+              <a:buChar char="•"/>
+              <a:defRPr sz="1800" kern="1200">
+                <a:solidFill>
+                  <a:schemeClr val="tx1"/>
+                </a:solidFill>
+                <a:latin typeface="+mn-lt"/>
+                <a:ea typeface="+mn-ea"/>
+                <a:cs typeface="+mn-cs"/>
+              </a:defRPr>
+            </a:lvl6pPr>
+            <a:lvl7pPr marL="2971800" indent="-228600" algn="l" defTabSz="914400" rtl="0" eaLnBrk="1" latinLnBrk="0" hangingPunct="1">
+              <a:lnSpc>
+                <a:spcPct val="90000"/>
+              </a:lnSpc>
+              <a:spcBef>
+                <a:spcPts val="500"/>
+              </a:spcBef>
+              <a:buFont typeface="Arial" panose="020B0604020202020204" pitchFamily="34" charset="0"/>
+              <a:buChar char="•"/>
+              <a:defRPr sz="1800" kern="1200">
+                <a:solidFill>
+                  <a:schemeClr val="tx1"/>
+                </a:solidFill>
+                <a:latin typeface="+mn-lt"/>
+                <a:ea typeface="+mn-ea"/>
+                <a:cs typeface="+mn-cs"/>
+              </a:defRPr>
+            </a:lvl7pPr>
+            <a:lvl8pPr marL="3429000" indent="-228600" algn="l" defTabSz="914400" rtl="0" eaLnBrk="1" latinLnBrk="0" hangingPunct="1">
+              <a:lnSpc>
+                <a:spcPct val="90000"/>
+              </a:lnSpc>
+              <a:spcBef>
+                <a:spcPts val="500"/>
+              </a:spcBef>
+              <a:buFont typeface="Arial" panose="020B0604020202020204" pitchFamily="34" charset="0"/>
+              <a:buChar char="•"/>
+              <a:defRPr sz="1800" kern="1200">
+                <a:solidFill>
+                  <a:schemeClr val="tx1"/>
+                </a:solidFill>
+                <a:latin typeface="+mn-lt"/>
+                <a:ea typeface="+mn-ea"/>
+                <a:cs typeface="+mn-cs"/>
+              </a:defRPr>
+            </a:lvl8pPr>
+            <a:lvl9pPr marL="3886200" indent="-228600" algn="l" defTabSz="914400" rtl="0" eaLnBrk="1" latinLnBrk="0" hangingPunct="1">
+              <a:lnSpc>
+                <a:spcPct val="90000"/>
+              </a:lnSpc>
+              <a:spcBef>
+                <a:spcPts val="500"/>
+              </a:spcBef>
+              <a:buFont typeface="Arial" panose="020B0604020202020204" pitchFamily="34" charset="0"/>
+              <a:buChar char="•"/>
+              <a:defRPr sz="1800" kern="1200">
+                <a:solidFill>
+                  <a:schemeClr val="tx1"/>
+                </a:solidFill>
+                <a:latin typeface="+mn-lt"/>
+                <a:ea typeface="+mn-ea"/>
+                <a:cs typeface="+mn-cs"/>
+              </a:defRPr>
+            </a:lvl9pPr>
+          </a:lstStyle>
+          <a:p>
+            <a:pPr marL="0" indent="0" eaLnBrk="0" fontAlgn="base" hangingPunct="0">
+              <a:lnSpc>
+                <a:spcPct val="100000"/>
+              </a:lnSpc>
+              <a:spcBef>
+                <a:spcPct val="0"/>
+              </a:spcBef>
+              <a:spcAft>
+                <a:spcPct val="0"/>
+              </a:spcAft>
+              <a:buFontTx/>
+              <a:buNone/>
+            </a:pPr>
+            <a:r>
+              <a:rPr lang="en-US" altLang="en-US" sz="1800" dirty="0">
+                <a:latin typeface="Times New Roman" panose="02020603050405020304" pitchFamily="18" charset="0"/>
+                <a:cs typeface="Times New Roman" panose="02020603050405020304" pitchFamily="18" charset="0"/>
+              </a:rPr>
+              <a:t>Generating a random sample of 100,000 from 268,187 entries. </a:t>
+            </a:r>
+          </a:p>
+        </p:txBody>
+      </p:sp>
+      <p:sp>
+        <p:nvSpPr>
+          <p:cNvPr id="6" name="Rectangle 1">
+            <a:extLst>
+              <a:ext uri="{FF2B5EF4-FFF2-40B4-BE49-F238E27FC236}">
+                <a16:creationId xmlns:a16="http://schemas.microsoft.com/office/drawing/2014/main" id="{BA314F13-E1A6-3938-6BE7-510E9CC84DCC}"/>
+              </a:ext>
+            </a:extLst>
+          </p:cNvPr>
+          <p:cNvSpPr txBox="1">
+            <a:spLocks noChangeArrowheads="1"/>
+          </p:cNvSpPr>
+          <p:nvPr/>
+        </p:nvSpPr>
+        <p:spPr bwMode="auto">
+          <a:xfrm>
+            <a:off x="838199" y="4304576"/>
+            <a:ext cx="9574162" cy="276999"/>
+          </a:xfrm>
+          <a:prstGeom prst="rect">
+            <a:avLst/>
+          </a:prstGeom>
+          <a:solidFill>
+            <a:srgbClr val="FFFFFF"/>
+          </a:solidFill>
+          <a:ln>
+            <a:noFill/>
+          </a:ln>
+          <a:effectLst/>
+          <a:extLst>
+            <a:ext uri="{91240B29-F687-4F45-9708-019B960494DF}">
+              <a14:hiddenLine xmlns:a14="http://schemas.microsoft.com/office/drawing/2010/main" w="9525">
+                <a:solidFill>
+                  <a:schemeClr val="tx1"/>
+                </a:solidFill>
+                <a:miter lim="800000"/>
+                <a:headEnd/>
+                <a:tailEnd/>
+              </a14:hiddenLine>
+            </a:ext>
+            <a:ext uri="{AF507438-7753-43E0-B8FC-AC1667EBCBE1}">
+              <a14:hiddenEffects xmlns:a14="http://schemas.microsoft.com/office/drawing/2010/main">
+                <a:effectLst>
+                  <a:outerShdw dist="35921" dir="2700000" algn="ctr" rotWithShape="0">
+                    <a:schemeClr val="bg2"/>
+                  </a:outerShdw>
+                </a:effectLst>
+              </a14:hiddenEffects>
+            </a:ext>
+          </a:extLst>
+        </p:spPr>
+        <p:txBody>
+          <a:bodyPr vert="horz" wrap="square" lIns="0" tIns="0" rIns="0" bIns="0" numCol="1" rtlCol="0" anchor="ctr" anchorCtr="0" compatLnSpc="1">
+            <a:prstTxWarp prst="textNoShape">
+              <a:avLst/>
+            </a:prstTxWarp>
+            <a:spAutoFit/>
+          </a:bodyPr>
+          <a:lstStyle>
+            <a:lvl1pPr marL="228600" indent="-228600" algn="l" defTabSz="914400" rtl="0" eaLnBrk="1" latinLnBrk="0" hangingPunct="1">
+              <a:lnSpc>
+                <a:spcPct val="90000"/>
+              </a:lnSpc>
+              <a:spcBef>
+                <a:spcPts val="1000"/>
+              </a:spcBef>
+              <a:buFont typeface="Arial" panose="020B0604020202020204" pitchFamily="34" charset="0"/>
+              <a:buChar char="•"/>
+              <a:defRPr sz="2800" kern="1200">
+                <a:solidFill>
+                  <a:schemeClr val="tx1"/>
+                </a:solidFill>
+                <a:latin typeface="+mn-lt"/>
+                <a:ea typeface="+mn-ea"/>
+                <a:cs typeface="+mn-cs"/>
+              </a:defRPr>
+            </a:lvl1pPr>
+            <a:lvl2pPr marL="685800" indent="-228600" algn="l" defTabSz="914400" rtl="0" eaLnBrk="1" latinLnBrk="0" hangingPunct="1">
+              <a:lnSpc>
+                <a:spcPct val="90000"/>
+              </a:lnSpc>
+              <a:spcBef>
+                <a:spcPts val="500"/>
+              </a:spcBef>
+              <a:buFont typeface="Arial" panose="020B0604020202020204" pitchFamily="34" charset="0"/>
+              <a:buChar char="•"/>
+              <a:defRPr sz="2400" kern="1200">
+                <a:solidFill>
+                  <a:schemeClr val="tx1"/>
+                </a:solidFill>
+                <a:latin typeface="+mn-lt"/>
+                <a:ea typeface="+mn-ea"/>
+                <a:cs typeface="+mn-cs"/>
+              </a:defRPr>
+            </a:lvl2pPr>
+            <a:lvl3pPr marL="1143000" indent="-228600" algn="l" defTabSz="914400" rtl="0" eaLnBrk="1" latinLnBrk="0" hangingPunct="1">
+              <a:lnSpc>
+                <a:spcPct val="90000"/>
+              </a:lnSpc>
+              <a:spcBef>
+                <a:spcPts val="500"/>
+              </a:spcBef>
+              <a:buFont typeface="Arial" panose="020B0604020202020204" pitchFamily="34" charset="0"/>
+              <a:buChar char="•"/>
+              <a:defRPr sz="2000" kern="1200">
+                <a:solidFill>
+                  <a:schemeClr val="tx1"/>
+                </a:solidFill>
+                <a:latin typeface="+mn-lt"/>
+                <a:ea typeface="+mn-ea"/>
+                <a:cs typeface="+mn-cs"/>
+              </a:defRPr>
+            </a:lvl3pPr>
+            <a:lvl4pPr marL="1600200" indent="-228600" algn="l" defTabSz="914400" rtl="0" eaLnBrk="1" latinLnBrk="0" hangingPunct="1">
+              <a:lnSpc>
+                <a:spcPct val="90000"/>
+              </a:lnSpc>
+              <a:spcBef>
+                <a:spcPts val="500"/>
+              </a:spcBef>
+              <a:buFont typeface="Arial" panose="020B0604020202020204" pitchFamily="34" charset="0"/>
+              <a:buChar char="•"/>
+              <a:defRPr sz="1800" kern="1200">
+                <a:solidFill>
+                  <a:schemeClr val="tx1"/>
+                </a:solidFill>
+                <a:latin typeface="+mn-lt"/>
+                <a:ea typeface="+mn-ea"/>
+                <a:cs typeface="+mn-cs"/>
+              </a:defRPr>
+            </a:lvl4pPr>
+            <a:lvl5pPr marL="2057400" indent="-228600" algn="l" defTabSz="914400" rtl="0" eaLnBrk="1" latinLnBrk="0" hangingPunct="1">
+              <a:lnSpc>
+                <a:spcPct val="90000"/>
+              </a:lnSpc>
+              <a:spcBef>
+                <a:spcPts val="500"/>
+              </a:spcBef>
+              <a:buFont typeface="Arial" panose="020B0604020202020204" pitchFamily="34" charset="0"/>
+              <a:buChar char="•"/>
+              <a:defRPr sz="1800" kern="1200">
+                <a:solidFill>
+                  <a:schemeClr val="tx1"/>
+                </a:solidFill>
+                <a:latin typeface="+mn-lt"/>
+                <a:ea typeface="+mn-ea"/>
+                <a:cs typeface="+mn-cs"/>
+              </a:defRPr>
+            </a:lvl5pPr>
+            <a:lvl6pPr marL="2514600" indent="-228600" algn="l" defTabSz="914400" rtl="0" eaLnBrk="1" latinLnBrk="0" hangingPunct="1">
+              <a:lnSpc>
+                <a:spcPct val="90000"/>
+              </a:lnSpc>
+              <a:spcBef>
+                <a:spcPts val="500"/>
+              </a:spcBef>
+              <a:buFont typeface="Arial" panose="020B0604020202020204" pitchFamily="34" charset="0"/>
+              <a:buChar char="•"/>
+              <a:defRPr sz="1800" kern="1200">
+                <a:solidFill>
+                  <a:schemeClr val="tx1"/>
+                </a:solidFill>
+                <a:latin typeface="+mn-lt"/>
+                <a:ea typeface="+mn-ea"/>
+                <a:cs typeface="+mn-cs"/>
+              </a:defRPr>
+            </a:lvl6pPr>
+            <a:lvl7pPr marL="2971800" indent="-228600" algn="l" defTabSz="914400" rtl="0" eaLnBrk="1" latinLnBrk="0" hangingPunct="1">
+              <a:lnSpc>
+                <a:spcPct val="90000"/>
+              </a:lnSpc>
+              <a:spcBef>
+                <a:spcPts val="500"/>
+              </a:spcBef>
+              <a:buFont typeface="Arial" panose="020B0604020202020204" pitchFamily="34" charset="0"/>
+              <a:buChar char="•"/>
+              <a:defRPr sz="1800" kern="1200">
+                <a:solidFill>
+                  <a:schemeClr val="tx1"/>
+                </a:solidFill>
+                <a:latin typeface="+mn-lt"/>
+                <a:ea typeface="+mn-ea"/>
+                <a:cs typeface="+mn-cs"/>
+              </a:defRPr>
+            </a:lvl7pPr>
+            <a:lvl8pPr marL="3429000" indent="-228600" algn="l" defTabSz="914400" rtl="0" eaLnBrk="1" latinLnBrk="0" hangingPunct="1">
+              <a:lnSpc>
+                <a:spcPct val="90000"/>
+              </a:lnSpc>
+              <a:spcBef>
+                <a:spcPts val="500"/>
+              </a:spcBef>
+              <a:buFont typeface="Arial" panose="020B0604020202020204" pitchFamily="34" charset="0"/>
+              <a:buChar char="•"/>
+              <a:defRPr sz="1800" kern="1200">
+                <a:solidFill>
+                  <a:schemeClr val="tx1"/>
+                </a:solidFill>
+                <a:latin typeface="+mn-lt"/>
+                <a:ea typeface="+mn-ea"/>
+                <a:cs typeface="+mn-cs"/>
+              </a:defRPr>
+            </a:lvl8pPr>
+            <a:lvl9pPr marL="3886200" indent="-228600" algn="l" defTabSz="914400" rtl="0" eaLnBrk="1" latinLnBrk="0" hangingPunct="1">
+              <a:lnSpc>
+                <a:spcPct val="90000"/>
+              </a:lnSpc>
+              <a:spcBef>
+                <a:spcPts val="500"/>
+              </a:spcBef>
+              <a:buFont typeface="Arial" panose="020B0604020202020204" pitchFamily="34" charset="0"/>
+              <a:buChar char="•"/>
+              <a:defRPr sz="1800" kern="1200">
+                <a:solidFill>
+                  <a:schemeClr val="tx1"/>
+                </a:solidFill>
+                <a:latin typeface="+mn-lt"/>
+                <a:ea typeface="+mn-ea"/>
+                <a:cs typeface="+mn-cs"/>
+              </a:defRPr>
+            </a:lvl9pPr>
+          </a:lstStyle>
+          <a:p>
+            <a:pPr marL="0" indent="0" eaLnBrk="0" fontAlgn="base" hangingPunct="0">
+              <a:lnSpc>
+                <a:spcPct val="100000"/>
+              </a:lnSpc>
+              <a:spcBef>
+                <a:spcPct val="0"/>
+              </a:spcBef>
+              <a:spcAft>
+                <a:spcPct val="0"/>
+              </a:spcAft>
+              <a:buFontTx/>
+              <a:buNone/>
+            </a:pPr>
+            <a:r>
+              <a:rPr lang="en-US" altLang="en-US" sz="1800" dirty="0">
+                <a:latin typeface="Times New Roman" panose="02020603050405020304" pitchFamily="18" charset="0"/>
+                <a:cs typeface="Times New Roman" panose="02020603050405020304" pitchFamily="18" charset="0"/>
+              </a:rPr>
+              <a:t>Filtering data where there is presence of tags and where there is no tags </a:t>
+            </a:r>
+          </a:p>
+        </p:txBody>
+      </p:sp>
+      <p:sp>
+        <p:nvSpPr>
+          <p:cNvPr id="7" name="Rectangle 1">
+            <a:extLst>
+              <a:ext uri="{FF2B5EF4-FFF2-40B4-BE49-F238E27FC236}">
+                <a16:creationId xmlns:a16="http://schemas.microsoft.com/office/drawing/2014/main" id="{E78B02B8-CFF9-BC06-6937-7291A273FC40}"/>
+              </a:ext>
+            </a:extLst>
+          </p:cNvPr>
+          <p:cNvSpPr txBox="1">
+            <a:spLocks noChangeArrowheads="1"/>
+          </p:cNvSpPr>
+          <p:nvPr/>
+        </p:nvSpPr>
+        <p:spPr bwMode="auto">
+          <a:xfrm>
+            <a:off x="838199" y="4923423"/>
+            <a:ext cx="9574162" cy="276999"/>
+          </a:xfrm>
+          <a:prstGeom prst="rect">
+            <a:avLst/>
+          </a:prstGeom>
+          <a:solidFill>
+            <a:srgbClr val="FFFFFF"/>
+          </a:solidFill>
+          <a:ln>
+            <a:noFill/>
+          </a:ln>
+          <a:effectLst/>
+          <a:extLst>
+            <a:ext uri="{91240B29-F687-4F45-9708-019B960494DF}">
+              <a14:hiddenLine xmlns:a14="http://schemas.microsoft.com/office/drawing/2010/main" w="9525">
+                <a:solidFill>
+                  <a:schemeClr val="tx1"/>
+                </a:solidFill>
+                <a:miter lim="800000"/>
+                <a:headEnd/>
+                <a:tailEnd/>
+              </a14:hiddenLine>
+            </a:ext>
+            <a:ext uri="{AF507438-7753-43E0-B8FC-AC1667EBCBE1}">
+              <a14:hiddenEffects xmlns:a14="http://schemas.microsoft.com/office/drawing/2010/main">
+                <a:effectLst>
+                  <a:outerShdw dist="35921" dir="2700000" algn="ctr" rotWithShape="0">
+                    <a:schemeClr val="bg2"/>
+                  </a:outerShdw>
+                </a:effectLst>
+              </a14:hiddenEffects>
+            </a:ext>
+          </a:extLst>
+        </p:spPr>
+        <p:txBody>
+          <a:bodyPr vert="horz" wrap="square" lIns="0" tIns="0" rIns="0" bIns="0" numCol="1" rtlCol="0" anchor="ctr" anchorCtr="0" compatLnSpc="1">
+            <a:prstTxWarp prst="textNoShape">
+              <a:avLst/>
+            </a:prstTxWarp>
+            <a:spAutoFit/>
+          </a:bodyPr>
+          <a:lstStyle>
+            <a:lvl1pPr marL="228600" indent="-228600" algn="l" defTabSz="914400" rtl="0" eaLnBrk="1" latinLnBrk="0" hangingPunct="1">
+              <a:lnSpc>
+                <a:spcPct val="90000"/>
+              </a:lnSpc>
+              <a:spcBef>
+                <a:spcPts val="1000"/>
+              </a:spcBef>
+              <a:buFont typeface="Arial" panose="020B0604020202020204" pitchFamily="34" charset="0"/>
+              <a:buChar char="•"/>
+              <a:defRPr sz="2800" kern="1200">
+                <a:solidFill>
+                  <a:schemeClr val="tx1"/>
+                </a:solidFill>
+                <a:latin typeface="+mn-lt"/>
+                <a:ea typeface="+mn-ea"/>
+                <a:cs typeface="+mn-cs"/>
+              </a:defRPr>
+            </a:lvl1pPr>
+            <a:lvl2pPr marL="685800" indent="-228600" algn="l" defTabSz="914400" rtl="0" eaLnBrk="1" latinLnBrk="0" hangingPunct="1">
+              <a:lnSpc>
+                <a:spcPct val="90000"/>
+              </a:lnSpc>
+              <a:spcBef>
+                <a:spcPts val="500"/>
+              </a:spcBef>
+              <a:buFont typeface="Arial" panose="020B0604020202020204" pitchFamily="34" charset="0"/>
+              <a:buChar char="•"/>
+              <a:defRPr sz="2400" kern="1200">
+                <a:solidFill>
+                  <a:schemeClr val="tx1"/>
+                </a:solidFill>
+                <a:latin typeface="+mn-lt"/>
+                <a:ea typeface="+mn-ea"/>
+                <a:cs typeface="+mn-cs"/>
+              </a:defRPr>
+            </a:lvl2pPr>
+            <a:lvl3pPr marL="1143000" indent="-228600" algn="l" defTabSz="914400" rtl="0" eaLnBrk="1" latinLnBrk="0" hangingPunct="1">
+              <a:lnSpc>
+                <a:spcPct val="90000"/>
+              </a:lnSpc>
+              <a:spcBef>
+                <a:spcPts val="500"/>
+              </a:spcBef>
+              <a:buFont typeface="Arial" panose="020B0604020202020204" pitchFamily="34" charset="0"/>
+              <a:buChar char="•"/>
+              <a:defRPr sz="2000" kern="1200">
+                <a:solidFill>
+                  <a:schemeClr val="tx1"/>
+                </a:solidFill>
+                <a:latin typeface="+mn-lt"/>
+                <a:ea typeface="+mn-ea"/>
+                <a:cs typeface="+mn-cs"/>
+              </a:defRPr>
+            </a:lvl3pPr>
+            <a:lvl4pPr marL="1600200" indent="-228600" algn="l" defTabSz="914400" rtl="0" eaLnBrk="1" latinLnBrk="0" hangingPunct="1">
+              <a:lnSpc>
+                <a:spcPct val="90000"/>
+              </a:lnSpc>
+              <a:spcBef>
+                <a:spcPts val="500"/>
+              </a:spcBef>
+              <a:buFont typeface="Arial" panose="020B0604020202020204" pitchFamily="34" charset="0"/>
+              <a:buChar char="•"/>
+              <a:defRPr sz="1800" kern="1200">
+                <a:solidFill>
+                  <a:schemeClr val="tx1"/>
+                </a:solidFill>
+                <a:latin typeface="+mn-lt"/>
+                <a:ea typeface="+mn-ea"/>
+                <a:cs typeface="+mn-cs"/>
+              </a:defRPr>
+            </a:lvl4pPr>
+            <a:lvl5pPr marL="2057400" indent="-228600" algn="l" defTabSz="914400" rtl="0" eaLnBrk="1" latinLnBrk="0" hangingPunct="1">
+              <a:lnSpc>
+                <a:spcPct val="90000"/>
+              </a:lnSpc>
+              <a:spcBef>
+                <a:spcPts val="500"/>
+              </a:spcBef>
+              <a:buFont typeface="Arial" panose="020B0604020202020204" pitchFamily="34" charset="0"/>
+              <a:buChar char="•"/>
+              <a:defRPr sz="1800" kern="1200">
+                <a:solidFill>
+                  <a:schemeClr val="tx1"/>
+                </a:solidFill>
+                <a:latin typeface="+mn-lt"/>
+                <a:ea typeface="+mn-ea"/>
+                <a:cs typeface="+mn-cs"/>
+              </a:defRPr>
+            </a:lvl5pPr>
+            <a:lvl6pPr marL="2514600" indent="-228600" algn="l" defTabSz="914400" rtl="0" eaLnBrk="1" latinLnBrk="0" hangingPunct="1">
+              <a:lnSpc>
+                <a:spcPct val="90000"/>
+              </a:lnSpc>
+              <a:spcBef>
+                <a:spcPts val="500"/>
+              </a:spcBef>
+              <a:buFont typeface="Arial" panose="020B0604020202020204" pitchFamily="34" charset="0"/>
+              <a:buChar char="•"/>
+              <a:defRPr sz="1800" kern="1200">
+                <a:solidFill>
+                  <a:schemeClr val="tx1"/>
+                </a:solidFill>
+                <a:latin typeface="+mn-lt"/>
+                <a:ea typeface="+mn-ea"/>
+                <a:cs typeface="+mn-cs"/>
+              </a:defRPr>
+            </a:lvl6pPr>
+            <a:lvl7pPr marL="2971800" indent="-228600" algn="l" defTabSz="914400" rtl="0" eaLnBrk="1" latinLnBrk="0" hangingPunct="1">
+              <a:lnSpc>
+                <a:spcPct val="90000"/>
+              </a:lnSpc>
+              <a:spcBef>
+                <a:spcPts val="500"/>
+              </a:spcBef>
+              <a:buFont typeface="Arial" panose="020B0604020202020204" pitchFamily="34" charset="0"/>
+              <a:buChar char="•"/>
+              <a:defRPr sz="1800" kern="1200">
+                <a:solidFill>
+                  <a:schemeClr val="tx1"/>
+                </a:solidFill>
+                <a:latin typeface="+mn-lt"/>
+                <a:ea typeface="+mn-ea"/>
+                <a:cs typeface="+mn-cs"/>
+              </a:defRPr>
+            </a:lvl7pPr>
+            <a:lvl8pPr marL="3429000" indent="-228600" algn="l" defTabSz="914400" rtl="0" eaLnBrk="1" latinLnBrk="0" hangingPunct="1">
+              <a:lnSpc>
+                <a:spcPct val="90000"/>
+              </a:lnSpc>
+              <a:spcBef>
+                <a:spcPts val="500"/>
+              </a:spcBef>
+              <a:buFont typeface="Arial" panose="020B0604020202020204" pitchFamily="34" charset="0"/>
+              <a:buChar char="•"/>
+              <a:defRPr sz="1800" kern="1200">
+                <a:solidFill>
+                  <a:schemeClr val="tx1"/>
+                </a:solidFill>
+                <a:latin typeface="+mn-lt"/>
+                <a:ea typeface="+mn-ea"/>
+                <a:cs typeface="+mn-cs"/>
+              </a:defRPr>
+            </a:lvl8pPr>
+            <a:lvl9pPr marL="3886200" indent="-228600" algn="l" defTabSz="914400" rtl="0" eaLnBrk="1" latinLnBrk="0" hangingPunct="1">
+              <a:lnSpc>
+                <a:spcPct val="90000"/>
+              </a:lnSpc>
+              <a:spcBef>
+                <a:spcPts val="500"/>
+              </a:spcBef>
+              <a:buFont typeface="Arial" panose="020B0604020202020204" pitchFamily="34" charset="0"/>
+              <a:buChar char="•"/>
+              <a:defRPr sz="1800" kern="1200">
+                <a:solidFill>
+                  <a:schemeClr val="tx1"/>
+                </a:solidFill>
+                <a:latin typeface="+mn-lt"/>
+                <a:ea typeface="+mn-ea"/>
+                <a:cs typeface="+mn-cs"/>
+              </a:defRPr>
+            </a:lvl9pPr>
+          </a:lstStyle>
+          <a:p>
+            <a:pPr marL="0" indent="0" eaLnBrk="0" fontAlgn="base" hangingPunct="0">
+              <a:lnSpc>
+                <a:spcPct val="100000"/>
+              </a:lnSpc>
+              <a:spcBef>
+                <a:spcPct val="0"/>
+              </a:spcBef>
+              <a:spcAft>
+                <a:spcPct val="0"/>
+              </a:spcAft>
+              <a:buFontTx/>
+              <a:buNone/>
+            </a:pPr>
+            <a:r>
+              <a:rPr lang="en-US" altLang="en-US" sz="1800" dirty="0">
+                <a:latin typeface="Times New Roman" panose="02020603050405020304" pitchFamily="18" charset="0"/>
+                <a:cs typeface="Times New Roman" panose="02020603050405020304" pitchFamily="18" charset="0"/>
+              </a:rPr>
+              <a:t>Merging tags together with weights for the data selected for regression model with join.</a:t>
+            </a:r>
+          </a:p>
+        </p:txBody>
+      </p:sp>
+      <p:sp>
+        <p:nvSpPr>
+          <p:cNvPr id="8" name="Rectangle 1">
+            <a:extLst>
+              <a:ext uri="{FF2B5EF4-FFF2-40B4-BE49-F238E27FC236}">
+                <a16:creationId xmlns:a16="http://schemas.microsoft.com/office/drawing/2014/main" id="{D8E9A8C3-657D-260F-FA40-FAA90DCF2B0F}"/>
+              </a:ext>
+            </a:extLst>
+          </p:cNvPr>
+          <p:cNvSpPr txBox="1">
+            <a:spLocks noChangeArrowheads="1"/>
+          </p:cNvSpPr>
+          <p:nvPr/>
+        </p:nvSpPr>
+        <p:spPr bwMode="auto">
+          <a:xfrm>
+            <a:off x="838199" y="5542270"/>
+            <a:ext cx="9574162" cy="553998"/>
+          </a:xfrm>
+          <a:prstGeom prst="rect">
+            <a:avLst/>
+          </a:prstGeom>
+          <a:solidFill>
+            <a:srgbClr val="FFFFFF"/>
+          </a:solidFill>
+          <a:ln>
+            <a:noFill/>
+          </a:ln>
+          <a:effectLst/>
+          <a:extLst>
+            <a:ext uri="{91240B29-F687-4F45-9708-019B960494DF}">
+              <a14:hiddenLine xmlns:a14="http://schemas.microsoft.com/office/drawing/2010/main" w="9525">
+                <a:solidFill>
+                  <a:schemeClr val="tx1"/>
+                </a:solidFill>
+                <a:miter lim="800000"/>
+                <a:headEnd/>
+                <a:tailEnd/>
+              </a14:hiddenLine>
+            </a:ext>
+            <a:ext uri="{AF507438-7753-43E0-B8FC-AC1667EBCBE1}">
+              <a14:hiddenEffects xmlns:a14="http://schemas.microsoft.com/office/drawing/2010/main">
+                <a:effectLst>
+                  <a:outerShdw dist="35921" dir="2700000" algn="ctr" rotWithShape="0">
+                    <a:schemeClr val="bg2"/>
+                  </a:outerShdw>
+                </a:effectLst>
+              </a14:hiddenEffects>
+            </a:ext>
+          </a:extLst>
+        </p:spPr>
+        <p:txBody>
+          <a:bodyPr vert="horz" wrap="square" lIns="0" tIns="0" rIns="0" bIns="0" numCol="1" rtlCol="0" anchor="ctr" anchorCtr="0" compatLnSpc="1">
+            <a:prstTxWarp prst="textNoShape">
+              <a:avLst/>
+            </a:prstTxWarp>
+            <a:spAutoFit/>
+          </a:bodyPr>
+          <a:lstStyle>
+            <a:lvl1pPr marL="228600" indent="-228600" algn="l" defTabSz="914400" rtl="0" eaLnBrk="1" latinLnBrk="0" hangingPunct="1">
+              <a:lnSpc>
+                <a:spcPct val="90000"/>
+              </a:lnSpc>
+              <a:spcBef>
+                <a:spcPts val="1000"/>
+              </a:spcBef>
+              <a:buFont typeface="Arial" panose="020B0604020202020204" pitchFamily="34" charset="0"/>
+              <a:buChar char="•"/>
+              <a:defRPr sz="2800" kern="1200">
+                <a:solidFill>
+                  <a:schemeClr val="tx1"/>
+                </a:solidFill>
+                <a:latin typeface="+mn-lt"/>
+                <a:ea typeface="+mn-ea"/>
+                <a:cs typeface="+mn-cs"/>
+              </a:defRPr>
+            </a:lvl1pPr>
+            <a:lvl2pPr marL="685800" indent="-228600" algn="l" defTabSz="914400" rtl="0" eaLnBrk="1" latinLnBrk="0" hangingPunct="1">
+              <a:lnSpc>
+                <a:spcPct val="90000"/>
+              </a:lnSpc>
+              <a:spcBef>
+                <a:spcPts val="500"/>
+              </a:spcBef>
+              <a:buFont typeface="Arial" panose="020B0604020202020204" pitchFamily="34" charset="0"/>
+              <a:buChar char="•"/>
+              <a:defRPr sz="2400" kern="1200">
+                <a:solidFill>
+                  <a:schemeClr val="tx1"/>
+                </a:solidFill>
+                <a:latin typeface="+mn-lt"/>
+                <a:ea typeface="+mn-ea"/>
+                <a:cs typeface="+mn-cs"/>
+              </a:defRPr>
+            </a:lvl2pPr>
+            <a:lvl3pPr marL="1143000" indent="-228600" algn="l" defTabSz="914400" rtl="0" eaLnBrk="1" latinLnBrk="0" hangingPunct="1">
+              <a:lnSpc>
+                <a:spcPct val="90000"/>
+              </a:lnSpc>
+              <a:spcBef>
+                <a:spcPts val="500"/>
+              </a:spcBef>
+              <a:buFont typeface="Arial" panose="020B0604020202020204" pitchFamily="34" charset="0"/>
+              <a:buChar char="•"/>
+              <a:defRPr sz="2000" kern="1200">
+                <a:solidFill>
+                  <a:schemeClr val="tx1"/>
+                </a:solidFill>
+                <a:latin typeface="+mn-lt"/>
+                <a:ea typeface="+mn-ea"/>
+                <a:cs typeface="+mn-cs"/>
+              </a:defRPr>
+            </a:lvl3pPr>
+            <a:lvl4pPr marL="1600200" indent="-228600" algn="l" defTabSz="914400" rtl="0" eaLnBrk="1" latinLnBrk="0" hangingPunct="1">
+              <a:lnSpc>
+                <a:spcPct val="90000"/>
+              </a:lnSpc>
+              <a:spcBef>
+                <a:spcPts val="500"/>
+              </a:spcBef>
+              <a:buFont typeface="Arial" panose="020B0604020202020204" pitchFamily="34" charset="0"/>
+              <a:buChar char="•"/>
+              <a:defRPr sz="1800" kern="1200">
+                <a:solidFill>
+                  <a:schemeClr val="tx1"/>
+                </a:solidFill>
+                <a:latin typeface="+mn-lt"/>
+                <a:ea typeface="+mn-ea"/>
+                <a:cs typeface="+mn-cs"/>
+              </a:defRPr>
+            </a:lvl4pPr>
+            <a:lvl5pPr marL="2057400" indent="-228600" algn="l" defTabSz="914400" rtl="0" eaLnBrk="1" latinLnBrk="0" hangingPunct="1">
+              <a:lnSpc>
+                <a:spcPct val="90000"/>
+              </a:lnSpc>
+              <a:spcBef>
+                <a:spcPts val="500"/>
+              </a:spcBef>
+              <a:buFont typeface="Arial" panose="020B0604020202020204" pitchFamily="34" charset="0"/>
+              <a:buChar char="•"/>
+              <a:defRPr sz="1800" kern="1200">
+                <a:solidFill>
+                  <a:schemeClr val="tx1"/>
+                </a:solidFill>
+                <a:latin typeface="+mn-lt"/>
+                <a:ea typeface="+mn-ea"/>
+                <a:cs typeface="+mn-cs"/>
+              </a:defRPr>
+            </a:lvl5pPr>
+            <a:lvl6pPr marL="2514600" indent="-228600" algn="l" defTabSz="914400" rtl="0" eaLnBrk="1" latinLnBrk="0" hangingPunct="1">
+              <a:lnSpc>
+                <a:spcPct val="90000"/>
+              </a:lnSpc>
+              <a:spcBef>
+                <a:spcPts val="500"/>
+              </a:spcBef>
+              <a:buFont typeface="Arial" panose="020B0604020202020204" pitchFamily="34" charset="0"/>
+              <a:buChar char="•"/>
+              <a:defRPr sz="1800" kern="1200">
+                <a:solidFill>
+                  <a:schemeClr val="tx1"/>
+                </a:solidFill>
+                <a:latin typeface="+mn-lt"/>
+                <a:ea typeface="+mn-ea"/>
+                <a:cs typeface="+mn-cs"/>
+              </a:defRPr>
+            </a:lvl6pPr>
+            <a:lvl7pPr marL="2971800" indent="-228600" algn="l" defTabSz="914400" rtl="0" eaLnBrk="1" latinLnBrk="0" hangingPunct="1">
+              <a:lnSpc>
+                <a:spcPct val="90000"/>
+              </a:lnSpc>
+              <a:spcBef>
+                <a:spcPts val="500"/>
+              </a:spcBef>
+              <a:buFont typeface="Arial" panose="020B0604020202020204" pitchFamily="34" charset="0"/>
+              <a:buChar char="•"/>
+              <a:defRPr sz="1800" kern="1200">
+                <a:solidFill>
+                  <a:schemeClr val="tx1"/>
+                </a:solidFill>
+                <a:latin typeface="+mn-lt"/>
+                <a:ea typeface="+mn-ea"/>
+                <a:cs typeface="+mn-cs"/>
+              </a:defRPr>
+            </a:lvl7pPr>
+            <a:lvl8pPr marL="3429000" indent="-228600" algn="l" defTabSz="914400" rtl="0" eaLnBrk="1" latinLnBrk="0" hangingPunct="1">
+              <a:lnSpc>
+                <a:spcPct val="90000"/>
+              </a:lnSpc>
+              <a:spcBef>
+                <a:spcPts val="500"/>
+              </a:spcBef>
+              <a:buFont typeface="Arial" panose="020B0604020202020204" pitchFamily="34" charset="0"/>
+              <a:buChar char="•"/>
+              <a:defRPr sz="1800" kern="1200">
+                <a:solidFill>
+                  <a:schemeClr val="tx1"/>
+                </a:solidFill>
+                <a:latin typeface="+mn-lt"/>
+                <a:ea typeface="+mn-ea"/>
+                <a:cs typeface="+mn-cs"/>
+              </a:defRPr>
+            </a:lvl8pPr>
+            <a:lvl9pPr marL="3886200" indent="-228600" algn="l" defTabSz="914400" rtl="0" eaLnBrk="1" latinLnBrk="0" hangingPunct="1">
+              <a:lnSpc>
+                <a:spcPct val="90000"/>
+              </a:lnSpc>
+              <a:spcBef>
+                <a:spcPts val="500"/>
+              </a:spcBef>
+              <a:buFont typeface="Arial" panose="020B0604020202020204" pitchFamily="34" charset="0"/>
+              <a:buChar char="•"/>
+              <a:defRPr sz="1800" kern="1200">
+                <a:solidFill>
+                  <a:schemeClr val="tx1"/>
+                </a:solidFill>
+                <a:latin typeface="+mn-lt"/>
+                <a:ea typeface="+mn-ea"/>
+                <a:cs typeface="+mn-cs"/>
+              </a:defRPr>
+            </a:lvl9pPr>
+          </a:lstStyle>
+          <a:p>
+            <a:pPr marL="0" indent="0" eaLnBrk="0" fontAlgn="base" hangingPunct="0">
+              <a:lnSpc>
+                <a:spcPct val="100000"/>
+              </a:lnSpc>
+              <a:spcBef>
+                <a:spcPct val="0"/>
+              </a:spcBef>
+              <a:spcAft>
+                <a:spcPct val="0"/>
+              </a:spcAft>
+              <a:buFontTx/>
+              <a:buNone/>
+            </a:pPr>
+            <a:r>
+              <a:rPr lang="en-US" altLang="en-US" sz="1800" dirty="0">
+                <a:latin typeface="Times New Roman" panose="02020603050405020304" pitchFamily="18" charset="0"/>
+                <a:cs typeface="Times New Roman" panose="02020603050405020304" pitchFamily="18" charset="0"/>
+              </a:rPr>
+              <a:t>Filtering data set such that each video can be assigned only one tag based on the highest weight of all the tags present in the video. </a:t>
+            </a:r>
+          </a:p>
+        </p:txBody>
+      </p:sp>
+    </p:spTree>
+    <p:extLst>
+      <p:ext uri="{BB962C8B-B14F-4D97-AF65-F5344CB8AC3E}">
+        <p14:creationId xmlns:p14="http://schemas.microsoft.com/office/powerpoint/2010/main" val="1925067195"/>
+      </p:ext>
+    </p:extLst>
+  </p:cSld>
+  <p:clrMapOvr>
+    <a:masterClrMapping/>
+  </p:clrMapOvr>
+</p:sld>
+</file>
+
+<file path=ppt/slides/slide11.xml><?xml version="1.0" encoding="utf-8"?>
+<p:sld xmlns:a="http://schemas.openxmlformats.org/drawingml/2006/main" xmlns:r="http://schemas.openxmlformats.org/officeDocument/2006/relationships" xmlns:p="http://schemas.openxmlformats.org/presentationml/2006/main">
+  <p:cSld>
+    <p:spTree>
+      <p:nvGrpSpPr>
+        <p:cNvPr id="1" name=""/>
+        <p:cNvGrpSpPr/>
+        <p:nvPr/>
+      </p:nvGrpSpPr>
+      <p:grpSpPr>
+        <a:xfrm>
+          <a:off x="0" y="0"/>
+          <a:ext cx="0" cy="0"/>
+          <a:chOff x="0" y="0"/>
+          <a:chExt cx="0" cy="0"/>
+        </a:xfrm>
+      </p:grpSpPr>
+      <p:sp>
+        <p:nvSpPr>
+          <p:cNvPr id="2" name="Title 1">
+            <a:extLst>
+              <a:ext uri="{FF2B5EF4-FFF2-40B4-BE49-F238E27FC236}">
+                <a16:creationId xmlns:a16="http://schemas.microsoft.com/office/drawing/2014/main" id="{5B554863-A2BB-6806-446C-7FE50492C5DF}"/>
+              </a:ext>
+            </a:extLst>
+          </p:cNvPr>
+          <p:cNvSpPr>
+            <a:spLocks noGrp="1"/>
+          </p:cNvSpPr>
+          <p:nvPr>
+            <p:ph type="title"/>
+          </p:nvPr>
+        </p:nvSpPr>
+        <p:spPr/>
+        <p:txBody>
+          <a:bodyPr/>
+          <a:lstStyle/>
+          <a:p>
+            <a:r>
+              <a:rPr lang="en-US" dirty="0"/>
+              <a:t>Visualizing based on tags and view count based on weight of tags. </a:t>
+            </a:r>
+          </a:p>
+        </p:txBody>
+      </p:sp>
+      <p:pic>
+        <p:nvPicPr>
+          <p:cNvPr id="7" name="Content Placeholder 6">
+            <a:extLst>
+              <a:ext uri="{FF2B5EF4-FFF2-40B4-BE49-F238E27FC236}">
+                <a16:creationId xmlns:a16="http://schemas.microsoft.com/office/drawing/2014/main" id="{3A2917DA-D33D-9A47-526C-171CAD669B94}"/>
+              </a:ext>
+            </a:extLst>
+          </p:cNvPr>
+          <p:cNvPicPr>
+            <a:picLocks noGrp="1" noChangeAspect="1"/>
+          </p:cNvPicPr>
+          <p:nvPr>
+            <p:ph idx="1"/>
+          </p:nvPr>
+        </p:nvPicPr>
+        <p:blipFill>
+          <a:blip r:embed="rId2">
+            <a:extLst>
+              <a:ext uri="{28A0092B-C50C-407E-A947-70E740481C1C}">
+                <a14:useLocalDpi xmlns:a14="http://schemas.microsoft.com/office/drawing/2010/main" val="0"/>
+              </a:ext>
+            </a:extLst>
+          </a:blip>
+          <a:stretch>
+            <a:fillRect/>
+          </a:stretch>
+        </p:blipFill>
+        <p:spPr>
+          <a:xfrm>
+            <a:off x="3308635" y="1860604"/>
+            <a:ext cx="5574729" cy="4632271"/>
+          </a:xfrm>
+        </p:spPr>
+      </p:pic>
+    </p:spTree>
+    <p:extLst>
+      <p:ext uri="{BB962C8B-B14F-4D97-AF65-F5344CB8AC3E}">
+        <p14:creationId xmlns:p14="http://schemas.microsoft.com/office/powerpoint/2010/main" val="3768541178"/>
+      </p:ext>
+    </p:extLst>
+  </p:cSld>
+  <p:clrMapOvr>
+    <a:masterClrMapping/>
+  </p:clrMapOvr>
+</p:sld>
+</file>
+
+<file path=ppt/slides/slide12.xml><?xml version="1.0" encoding="utf-8"?>
+<p:sld xmlns:a="http://schemas.openxmlformats.org/drawingml/2006/main" xmlns:r="http://schemas.openxmlformats.org/officeDocument/2006/relationships" xmlns:p="http://schemas.openxmlformats.org/presentationml/2006/main">
+  <p:cSld>
+    <p:spTree>
+      <p:nvGrpSpPr>
+        <p:cNvPr id="1" name=""/>
+        <p:cNvGrpSpPr/>
+        <p:nvPr/>
+      </p:nvGrpSpPr>
+      <p:grpSpPr>
+        <a:xfrm>
+          <a:off x="0" y="0"/>
+          <a:ext cx="0" cy="0"/>
+          <a:chOff x="0" y="0"/>
+          <a:chExt cx="0" cy="0"/>
+        </a:xfrm>
+      </p:grpSpPr>
+      <p:sp>
+        <p:nvSpPr>
+          <p:cNvPr id="2" name="Title 1">
+            <a:extLst>
+              <a:ext uri="{FF2B5EF4-FFF2-40B4-BE49-F238E27FC236}">
+                <a16:creationId xmlns:a16="http://schemas.microsoft.com/office/drawing/2014/main" id="{A9EBAA1E-6AF3-1949-E8B2-FBB8A66B59CA}"/>
+              </a:ext>
+            </a:extLst>
+          </p:cNvPr>
+          <p:cNvSpPr>
+            <a:spLocks noGrp="1"/>
+          </p:cNvSpPr>
+          <p:nvPr>
+            <p:ph type="title"/>
+          </p:nvPr>
+        </p:nvSpPr>
+        <p:spPr/>
+        <p:txBody>
+          <a:bodyPr/>
+          <a:lstStyle/>
+          <a:p>
+            <a:r>
+              <a:rPr lang="en-US" dirty="0"/>
+              <a:t>Generating dummy variables and combining with data. </a:t>
+            </a:r>
+          </a:p>
+        </p:txBody>
+      </p:sp>
+      <p:pic>
+        <p:nvPicPr>
+          <p:cNvPr id="11" name="Content Placeholder 10">
+            <a:extLst>
+              <a:ext uri="{FF2B5EF4-FFF2-40B4-BE49-F238E27FC236}">
+                <a16:creationId xmlns:a16="http://schemas.microsoft.com/office/drawing/2014/main" id="{DD5471BF-8785-BFCE-F485-C8885BB243CD}"/>
+              </a:ext>
+            </a:extLst>
+          </p:cNvPr>
+          <p:cNvPicPr>
+            <a:picLocks noGrp="1" noChangeAspect="1"/>
+          </p:cNvPicPr>
+          <p:nvPr>
+            <p:ph idx="1"/>
+          </p:nvPr>
+        </p:nvPicPr>
+        <p:blipFill>
+          <a:blip r:embed="rId2">
+            <a:extLst>
+              <a:ext uri="{28A0092B-C50C-407E-A947-70E740481C1C}">
+                <a14:useLocalDpi xmlns:a14="http://schemas.microsoft.com/office/drawing/2010/main" val="0"/>
+              </a:ext>
+            </a:extLst>
+          </a:blip>
+          <a:stretch>
+            <a:fillRect/>
+          </a:stretch>
+        </p:blipFill>
+        <p:spPr>
+          <a:xfrm>
+            <a:off x="127819" y="2182352"/>
+            <a:ext cx="11936361" cy="3163621"/>
+          </a:xfrm>
+        </p:spPr>
+      </p:pic>
+    </p:spTree>
+    <p:extLst>
+      <p:ext uri="{BB962C8B-B14F-4D97-AF65-F5344CB8AC3E}">
+        <p14:creationId xmlns:p14="http://schemas.microsoft.com/office/powerpoint/2010/main" val="3876922181"/>
+      </p:ext>
+    </p:extLst>
+  </p:cSld>
+  <p:clrMapOvr>
+    <a:masterClrMapping/>
+  </p:clrMapOvr>
+</p:sld>
+</file>
+
+<file path=ppt/slides/slide13.xml><?xml version="1.0" encoding="utf-8"?>
+<p:sld xmlns:a="http://schemas.openxmlformats.org/drawingml/2006/main" xmlns:r="http://schemas.openxmlformats.org/officeDocument/2006/relationships" xmlns:p="http://schemas.openxmlformats.org/presentationml/2006/main">
+  <p:cSld>
+    <p:spTree>
+      <p:nvGrpSpPr>
+        <p:cNvPr id="1" name=""/>
+        <p:cNvGrpSpPr/>
+        <p:nvPr/>
+      </p:nvGrpSpPr>
+      <p:grpSpPr>
+        <a:xfrm>
+          <a:off x="0" y="0"/>
+          <a:ext cx="0" cy="0"/>
+          <a:chOff x="0" y="0"/>
+          <a:chExt cx="0" cy="0"/>
+        </a:xfrm>
+      </p:grpSpPr>
+      <p:sp>
+        <p:nvSpPr>
+          <p:cNvPr id="2" name="Title 1">
+            <a:extLst>
+              <a:ext uri="{FF2B5EF4-FFF2-40B4-BE49-F238E27FC236}">
+                <a16:creationId xmlns:a16="http://schemas.microsoft.com/office/drawing/2014/main" id="{A9EBAA1E-6AF3-1949-E8B2-FBB8A66B59CA}"/>
+              </a:ext>
+            </a:extLst>
+          </p:cNvPr>
+          <p:cNvSpPr>
+            <a:spLocks noGrp="1"/>
+          </p:cNvSpPr>
+          <p:nvPr>
+            <p:ph type="title"/>
+          </p:nvPr>
+        </p:nvSpPr>
+        <p:spPr/>
+        <p:txBody>
+          <a:bodyPr/>
+          <a:lstStyle/>
+          <a:p>
+            <a:r>
+              <a:rPr lang="en-US" dirty="0"/>
+              <a:t>ANOVA test for test of variance and result</a:t>
+            </a:r>
+          </a:p>
+        </p:txBody>
+      </p:sp>
+      <p:pic>
+        <p:nvPicPr>
+          <p:cNvPr id="6" name="Content Placeholder 5">
+            <a:extLst>
+              <a:ext uri="{FF2B5EF4-FFF2-40B4-BE49-F238E27FC236}">
+                <a16:creationId xmlns:a16="http://schemas.microsoft.com/office/drawing/2014/main" id="{F94FC184-F077-A029-585D-29B00E19A5BC}"/>
+              </a:ext>
+            </a:extLst>
+          </p:cNvPr>
+          <p:cNvPicPr>
+            <a:picLocks noGrp="1" noChangeAspect="1"/>
+          </p:cNvPicPr>
+          <p:nvPr>
+            <p:ph idx="1"/>
+          </p:nvPr>
+        </p:nvPicPr>
+        <p:blipFill>
+          <a:blip r:embed="rId2">
+            <a:extLst>
+              <a:ext uri="{28A0092B-C50C-407E-A947-70E740481C1C}">
+                <a14:useLocalDpi xmlns:a14="http://schemas.microsoft.com/office/drawing/2010/main" val="0"/>
+              </a:ext>
+            </a:extLst>
+          </a:blip>
+          <a:stretch>
+            <a:fillRect/>
+          </a:stretch>
+        </p:blipFill>
+        <p:spPr>
+          <a:xfrm>
+            <a:off x="2275942" y="1992077"/>
+            <a:ext cx="6562213" cy="3445162"/>
+          </a:xfrm>
+        </p:spPr>
+      </p:pic>
+    </p:spTree>
+    <p:extLst>
+      <p:ext uri="{BB962C8B-B14F-4D97-AF65-F5344CB8AC3E}">
+        <p14:creationId xmlns:p14="http://schemas.microsoft.com/office/powerpoint/2010/main" val="3007523516"/>
+      </p:ext>
+    </p:extLst>
+  </p:cSld>
+  <p:clrMapOvr>
+    <a:masterClrMapping/>
+  </p:clrMapOvr>
+</p:sld>
+</file>
+
+<file path=ppt/slides/slide14.xml><?xml version="1.0" encoding="utf-8"?>
+<p:sld xmlns:a="http://schemas.openxmlformats.org/drawingml/2006/main" xmlns:r="http://schemas.openxmlformats.org/officeDocument/2006/relationships" xmlns:p="http://schemas.openxmlformats.org/presentationml/2006/main">
+  <p:cSld>
+    <p:spTree>
+      <p:nvGrpSpPr>
+        <p:cNvPr id="1" name=""/>
+        <p:cNvGrpSpPr/>
+        <p:nvPr/>
+      </p:nvGrpSpPr>
+      <p:grpSpPr>
+        <a:xfrm>
+          <a:off x="0" y="0"/>
+          <a:ext cx="0" cy="0"/>
+          <a:chOff x="0" y="0"/>
+          <a:chExt cx="0" cy="0"/>
+        </a:xfrm>
+      </p:grpSpPr>
+      <p:sp>
+        <p:nvSpPr>
+          <p:cNvPr id="2" name="Title 1">
+            <a:extLst>
+              <a:ext uri="{FF2B5EF4-FFF2-40B4-BE49-F238E27FC236}">
+                <a16:creationId xmlns:a16="http://schemas.microsoft.com/office/drawing/2014/main" id="{A61A307F-10CB-6030-46FD-7C3726C68064}"/>
+              </a:ext>
+            </a:extLst>
+          </p:cNvPr>
+          <p:cNvSpPr>
+            <a:spLocks noGrp="1"/>
+          </p:cNvSpPr>
+          <p:nvPr>
+            <p:ph type="title"/>
+          </p:nvPr>
+        </p:nvSpPr>
+        <p:spPr/>
+        <p:txBody>
+          <a:bodyPr/>
+          <a:lstStyle/>
+          <a:p>
+            <a:r>
+              <a:rPr lang="en-US" dirty="0"/>
+              <a:t>Regression Model Summary Result</a:t>
+            </a:r>
+          </a:p>
+        </p:txBody>
+      </p:sp>
+      <p:pic>
+        <p:nvPicPr>
+          <p:cNvPr id="5" name="Content Placeholder 4">
+            <a:extLst>
+              <a:ext uri="{FF2B5EF4-FFF2-40B4-BE49-F238E27FC236}">
+                <a16:creationId xmlns:a16="http://schemas.microsoft.com/office/drawing/2014/main" id="{0A8AEBC5-950C-8401-DADF-C3ADF39E03C7}"/>
+              </a:ext>
+            </a:extLst>
+          </p:cNvPr>
+          <p:cNvPicPr>
+            <a:picLocks noGrp="1" noChangeAspect="1"/>
+          </p:cNvPicPr>
+          <p:nvPr>
+            <p:ph idx="1"/>
+          </p:nvPr>
+        </p:nvPicPr>
+        <p:blipFill>
+          <a:blip r:embed="rId2">
+            <a:extLst>
+              <a:ext uri="{28A0092B-C50C-407E-A947-70E740481C1C}">
+                <a14:useLocalDpi xmlns:a14="http://schemas.microsoft.com/office/drawing/2010/main" val="0"/>
+              </a:ext>
+            </a:extLst>
+          </a:blip>
+          <a:stretch>
+            <a:fillRect/>
+          </a:stretch>
+        </p:blipFill>
+        <p:spPr>
+          <a:xfrm>
+            <a:off x="1504335" y="1508989"/>
+            <a:ext cx="8052620" cy="5091598"/>
+          </a:xfrm>
+        </p:spPr>
+      </p:pic>
+    </p:spTree>
+    <p:extLst>
+      <p:ext uri="{BB962C8B-B14F-4D97-AF65-F5344CB8AC3E}">
+        <p14:creationId xmlns:p14="http://schemas.microsoft.com/office/powerpoint/2010/main" val="1883745879"/>
+      </p:ext>
+    </p:extLst>
+  </p:cSld>
+  <p:clrMapOvr>
+    <a:masterClrMapping/>
+  </p:clrMapOvr>
+</p:sld>
+</file>
+
+<file path=ppt/slides/slide15.xml><?xml version="1.0" encoding="utf-8"?>
+<p:sld xmlns:a="http://schemas.openxmlformats.org/drawingml/2006/main" xmlns:r="http://schemas.openxmlformats.org/officeDocument/2006/relationships" xmlns:p="http://schemas.openxmlformats.org/presentationml/2006/main">
+  <p:cSld>
+    <p:spTree>
+      <p:nvGrpSpPr>
+        <p:cNvPr id="1" name=""/>
+        <p:cNvGrpSpPr/>
+        <p:nvPr/>
+      </p:nvGrpSpPr>
+      <p:grpSpPr>
+        <a:xfrm>
+          <a:off x="0" y="0"/>
+          <a:ext cx="0" cy="0"/>
+          <a:chOff x="0" y="0"/>
+          <a:chExt cx="0" cy="0"/>
+        </a:xfrm>
+      </p:grpSpPr>
+      <p:sp>
+        <p:nvSpPr>
+          <p:cNvPr id="2" name="Title 1">
+            <a:extLst>
+              <a:ext uri="{FF2B5EF4-FFF2-40B4-BE49-F238E27FC236}">
+                <a16:creationId xmlns:a16="http://schemas.microsoft.com/office/drawing/2014/main" id="{DF738D80-1732-CEF4-7B26-636247F24FCB}"/>
+              </a:ext>
+            </a:extLst>
+          </p:cNvPr>
+          <p:cNvSpPr>
+            <a:spLocks noGrp="1"/>
+          </p:cNvSpPr>
+          <p:nvPr>
+            <p:ph type="title"/>
+          </p:nvPr>
+        </p:nvSpPr>
+        <p:spPr>
+          <a:xfrm>
+            <a:off x="562897" y="2469228"/>
+            <a:ext cx="10515600" cy="1325563"/>
+          </a:xfrm>
+        </p:spPr>
+        <p:txBody>
+          <a:bodyPr/>
+          <a:lstStyle/>
+          <a:p>
+            <a:pPr algn="ctr"/>
+            <a:r>
+              <a:rPr lang="en-US" dirty="0"/>
+              <a:t> Thank You</a:t>
+            </a:r>
+          </a:p>
+        </p:txBody>
+      </p:sp>
+    </p:spTree>
+    <p:extLst>
+      <p:ext uri="{BB962C8B-B14F-4D97-AF65-F5344CB8AC3E}">
+        <p14:creationId xmlns:p14="http://schemas.microsoft.com/office/powerpoint/2010/main" val="3588240262"/>
       </p:ext>
     </p:extLst>
   </p:cSld>
@@ -3806,7 +5695,7 @@
           <a:p>
             <a:r>
               <a:rPr lang="en-US" dirty="0"/>
-              <a:t>Thing I have done so far</a:t>
+              <a:t>Things Done before presentation</a:t>
             </a:r>
           </a:p>
         </p:txBody>
@@ -5104,7 +6993,7 @@
           <p:cNvPr id="2" name="Title 1">
             <a:extLst>
               <a:ext uri="{FF2B5EF4-FFF2-40B4-BE49-F238E27FC236}">
-                <a16:creationId xmlns:a16="http://schemas.microsoft.com/office/drawing/2014/main" id="{B6703FDC-19DB-A97E-328D-32AC0C02E1D1}"/>
+                <a16:creationId xmlns:a16="http://schemas.microsoft.com/office/drawing/2014/main" id="{5B554863-A2BB-6806-446C-7FE50492C5DF}"/>
               </a:ext>
             </a:extLst>
           </p:cNvPr>
@@ -5115,27 +7004,57 @@
             <p:ph type="title"/>
           </p:nvPr>
         </p:nvSpPr>
+        <p:spPr/>
+        <p:txBody>
+          <a:bodyPr/>
+          <a:lstStyle/>
+          <a:p>
+            <a:r>
+              <a:rPr lang="en-US" dirty="0"/>
+              <a:t>Scatter Plot After Spearman’s test</a:t>
+            </a:r>
+          </a:p>
+        </p:txBody>
+      </p:sp>
+      <p:pic>
+        <p:nvPicPr>
+          <p:cNvPr id="5" name="Content Placeholder 4">
+            <a:extLst>
+              <a:ext uri="{FF2B5EF4-FFF2-40B4-BE49-F238E27FC236}">
+                <a16:creationId xmlns:a16="http://schemas.microsoft.com/office/drawing/2014/main" id="{BDE85743-1695-DC1B-6EA5-0FA42DDD593E}"/>
+              </a:ext>
+            </a:extLst>
+          </p:cNvPr>
+          <p:cNvPicPr>
+            <a:picLocks noGrp="1" noChangeAspect="1"/>
+          </p:cNvPicPr>
+          <p:nvPr>
+            <p:ph idx="1"/>
+          </p:nvPr>
+        </p:nvPicPr>
+        <p:blipFill>
+          <a:blip r:embed="rId2">
+            <a:extLst>
+              <a:ext uri="{28A0092B-C50C-407E-A947-70E740481C1C}">
+                <a14:useLocalDpi xmlns:a14="http://schemas.microsoft.com/office/drawing/2010/main" val="0"/>
+              </a:ext>
+            </a:extLst>
+          </a:blip>
+          <a:stretch>
+            <a:fillRect/>
+          </a:stretch>
+        </p:blipFill>
         <p:spPr>
           <a:xfrm>
-            <a:off x="1143000" y="1987447"/>
-            <a:ext cx="10515600" cy="1325563"/>
+            <a:off x="2930175" y="1690688"/>
+            <a:ext cx="4778154" cy="3970364"/>
           </a:xfrm>
         </p:spPr>
-        <p:txBody>
-          <a:bodyPr/>
-          <a:lstStyle/>
-          <a:p>
-            <a:r>
-              <a:rPr lang="en-US" dirty="0"/>
-              <a:t>Thank You. Please ask questions and share some feedbacks. </a:t>
-            </a:r>
-          </a:p>
-        </p:txBody>
-      </p:sp>
+      </p:pic>
     </p:spTree>
     <p:extLst>
       <p:ext uri="{BB962C8B-B14F-4D97-AF65-F5344CB8AC3E}">
-        <p14:creationId xmlns:p14="http://schemas.microsoft.com/office/powerpoint/2010/main" val="698126019"/>
+        <p14:creationId xmlns:p14="http://schemas.microsoft.com/office/powerpoint/2010/main" val="3248478265"/>
       </p:ext>
     </p:extLst>
   </p:cSld>

</xml_diff>